<commit_message>
SCR 03 Stück für Stück ein Stück Musik
Für Promotion überarbeitet.
</commit_message>
<xml_diff>
--- a/training-cards/music moves/Scrum (SCR)/ger/apprentice/ger_SCR_03_stueck_fuer_stueck_ein_stueck_musik_MM_A.pptx
+++ b/training-cards/music moves/Scrum (SCR)/ger/apprentice/ger_SCR_03_stueck_fuer_stueck_ein_stueck_musik_MM_A.pptx
@@ -105,6 +105,22 @@
       </a:defRPr>
     </a:lvl9pPr>
   </p:defaultTextStyle>
+  <p:extLst>
+    <p:ext uri="{EFAFB233-063F-42B5-8137-9DF3F51BA10A}">
+      <p15:sldGuideLst xmlns:p15="http://schemas.microsoft.com/office/powerpoint/2012/main">
+        <p15:guide id="1" orient="horz" pos="652">
+          <p15:clr>
+            <a:srgbClr val="A4A3A4"/>
+          </p15:clr>
+        </p15:guide>
+        <p15:guide id="2">
+          <p15:clr>
+            <a:srgbClr val="A4A3A4"/>
+          </p15:clr>
+        </p15:guide>
+      </p15:sldGuideLst>
+    </p:ext>
+  </p:extLst>
 </p:presentation>
 </file>
 
@@ -153,10 +169,9 @@
           </a:lstStyle>
           <a:p>
             <a:r>
-              <a:rPr lang="de-DE" dirty="0" smtClean="0"/>
+              <a:rPr lang="de-DE" dirty="0"/>
               <a:t>TITEL HINZUFÜGEN</a:t>
             </a:r>
-            <a:endParaRPr lang="de-DE" dirty="0"/>
           </a:p>
         </p:txBody>
       </p:sp>
@@ -187,35 +202,35 @@
           <a:p>
             <a:pPr lvl="0"/>
             <a:r>
-              <a:rPr lang="de-DE" smtClean="0"/>
+              <a:rPr lang="de-DE"/>
               <a:t>Mastertextformat bearbeiten</a:t>
             </a:r>
           </a:p>
           <a:p>
             <a:pPr lvl="1"/>
             <a:r>
-              <a:rPr lang="de-DE" smtClean="0"/>
+              <a:rPr lang="de-DE"/>
               <a:t>Zweite Ebene</a:t>
             </a:r>
           </a:p>
           <a:p>
             <a:pPr lvl="2"/>
             <a:r>
-              <a:rPr lang="de-DE" smtClean="0"/>
+              <a:rPr lang="de-DE"/>
               <a:t>Dritte Ebene</a:t>
             </a:r>
           </a:p>
           <a:p>
             <a:pPr lvl="3"/>
             <a:r>
-              <a:rPr lang="de-DE" smtClean="0"/>
+              <a:rPr lang="de-DE"/>
               <a:t>Vierte Ebene</a:t>
             </a:r>
           </a:p>
           <a:p>
             <a:pPr lvl="4"/>
             <a:r>
-              <a:rPr lang="de-DE" smtClean="0"/>
+              <a:rPr lang="de-DE"/>
               <a:t>Fünfte Ebene</a:t>
             </a:r>
             <a:endParaRPr lang="de-DE" dirty="0"/>
@@ -262,7 +277,7 @@
               <a:buNone/>
             </a:pPr>
             <a:r>
-              <a:rPr lang="de-DE" smtClean="0"/>
+              <a:rPr lang="de-DE"/>
               <a:t>Master-Untertitelformat bearbeiten</a:t>
             </a:r>
             <a:endParaRPr lang="de-DE" dirty="0"/>
@@ -378,35 +393,35 @@
           <a:p>
             <a:pPr lvl="0"/>
             <a:r>
-              <a:rPr lang="de-DE" smtClean="0"/>
+              <a:rPr lang="de-DE"/>
               <a:t>Mastertextformat bearbeiten</a:t>
             </a:r>
           </a:p>
           <a:p>
             <a:pPr lvl="1"/>
             <a:r>
-              <a:rPr lang="de-DE" smtClean="0"/>
+              <a:rPr lang="de-DE"/>
               <a:t>Zweite Ebene</a:t>
             </a:r>
           </a:p>
           <a:p>
             <a:pPr lvl="2"/>
             <a:r>
-              <a:rPr lang="de-DE" smtClean="0"/>
+              <a:rPr lang="de-DE"/>
               <a:t>Dritte Ebene</a:t>
             </a:r>
           </a:p>
           <a:p>
             <a:pPr lvl="3"/>
             <a:r>
-              <a:rPr lang="de-DE" smtClean="0"/>
+              <a:rPr lang="de-DE"/>
               <a:t>Vierte Ebene</a:t>
             </a:r>
           </a:p>
           <a:p>
             <a:pPr lvl="4"/>
             <a:r>
-              <a:rPr lang="de-DE" smtClean="0"/>
+              <a:rPr lang="de-DE"/>
               <a:t>Fünfte Ebene</a:t>
             </a:r>
             <a:endParaRPr lang="de-DE" dirty="0"/>
@@ -436,7 +451,7 @@
           <a:lstStyle/>
           <a:p>
             <a:r>
-              <a:rPr lang="de-DE" sz="2400" dirty="0" smtClean="0">
+              <a:rPr lang="de-DE" sz="2400" dirty="0">
                 <a:solidFill>
                   <a:srgbClr val="7E006B"/>
                 </a:solidFill>
@@ -446,7 +461,7 @@
               <a:t>TRAININGS</a:t>
             </a:r>
             <a:r>
-              <a:rPr lang="de-DE" sz="2400" dirty="0" smtClean="0">
+              <a:rPr lang="de-DE" sz="2400" dirty="0">
                 <a:solidFill>
                   <a:srgbClr val="7E006B"/>
                 </a:solidFill>
@@ -514,7 +529,7 @@
           </a:ln>
           <a:extLst>
             <a:ext uri="{C572A759-6A51-4108-AA02-DFA0A04FC94B}">
-              <ma14:wrappingTextBoxFlag xmlns:ma14="http://schemas.microsoft.com/office/mac/drawingml/2011/main" val="1"/>
+              <ma14:wrappingTextBoxFlag xmlns="" xmlns:ma14="http://schemas.microsoft.com/office/mac/drawingml/2011/main" val="1"/>
             </a:ext>
           </a:extLst>
         </p:spPr>
@@ -620,7 +635,7 @@
                 <a:latin typeface="Avenir Light"/>
                 <a:cs typeface="Avenir Light"/>
               </a:rPr>
-              <a:t>19.01.16</a:t>
+              <a:t>27.11.18</a:t>
             </a:fld>
             <a:endParaRPr lang="de-DE" sz="600" dirty="0">
               <a:solidFill>
@@ -678,10 +693,9 @@
           <a:lstStyle/>
           <a:p>
             <a:r>
-              <a:rPr lang="de-DE" smtClean="0"/>
+              <a:rPr lang="de-DE"/>
               <a:t>Mastertitelformat bearbeiten</a:t>
             </a:r>
-            <a:endParaRPr lang="de-DE"/>
           </a:p>
         </p:txBody>
       </p:sp>
@@ -702,7 +716,7 @@
           <a:p>
             <a:fld id="{FF5B2BAF-DF38-0A48-A798-0C06E514FD52}" type="datetimeFigureOut">
               <a:rPr lang="de-DE" smtClean="0"/>
-              <a:t>19.01.16</a:t>
+              <a:t>27.11.18</a:t>
             </a:fld>
             <a:endParaRPr lang="de-DE" dirty="0"/>
           </a:p>
@@ -813,17 +827,16 @@
           <a:p>
             <a:pPr marL="0" lvl="0" algn="l"/>
             <a:r>
-              <a:rPr lang="de-DE" dirty="0" smtClean="0"/>
+              <a:rPr lang="de-DE" dirty="0"/>
               <a:t>Überschrift </a:t>
             </a:r>
             <a:br>
-              <a:rPr lang="de-DE" dirty="0" smtClean="0"/>
+              <a:rPr lang="de-DE" dirty="0"/>
             </a:br>
             <a:r>
-              <a:rPr lang="de-DE" dirty="0" smtClean="0"/>
+              <a:rPr lang="de-DE" dirty="0"/>
               <a:t>bearbeiten </a:t>
             </a:r>
-            <a:endParaRPr lang="de-DE" dirty="0"/>
           </a:p>
         </p:txBody>
       </p:sp>
@@ -854,38 +867,37 @@
           <a:p>
             <a:pPr lvl="0"/>
             <a:r>
-              <a:rPr lang="de-DE" dirty="0" smtClean="0"/>
+              <a:rPr lang="de-DE" dirty="0"/>
               <a:t>Mastertextformat bearbeiten</a:t>
             </a:r>
           </a:p>
           <a:p>
             <a:pPr lvl="1"/>
             <a:r>
-              <a:rPr lang="de-DE" dirty="0" smtClean="0"/>
+              <a:rPr lang="de-DE" dirty="0"/>
               <a:t>Zweite Ebene</a:t>
             </a:r>
           </a:p>
           <a:p>
             <a:pPr lvl="2"/>
             <a:r>
-              <a:rPr lang="de-DE" dirty="0" smtClean="0"/>
+              <a:rPr lang="de-DE" dirty="0"/>
               <a:t>Dritte Ebene</a:t>
             </a:r>
           </a:p>
           <a:p>
             <a:pPr lvl="3"/>
             <a:r>
-              <a:rPr lang="de-DE" dirty="0" smtClean="0"/>
+              <a:rPr lang="de-DE" dirty="0"/>
               <a:t>Vierte Ebene</a:t>
             </a:r>
           </a:p>
           <a:p>
             <a:pPr lvl="4"/>
             <a:r>
-              <a:rPr lang="de-DE" dirty="0" smtClean="0"/>
+              <a:rPr lang="de-DE" dirty="0"/>
               <a:t>Fünfte Ebene</a:t>
             </a:r>
-            <a:endParaRPr lang="de-DE" dirty="0"/>
           </a:p>
         </p:txBody>
       </p:sp>
@@ -924,7 +936,7 @@
           <a:p>
             <a:fld id="{FF5B2BAF-DF38-0A48-A798-0C06E514FD52}" type="datetimeFigureOut">
               <a:rPr lang="de-DE" smtClean="0"/>
-              <a:t>19.01.16</a:t>
+              <a:t>27.11.18</a:t>
             </a:fld>
             <a:endParaRPr lang="de-DE" dirty="0"/>
           </a:p>
@@ -1158,7 +1170,7 @@
           <a:lstStyle/>
           <a:p>
             <a:r>
-              <a:rPr lang="de-DE" sz="1050" b="1" dirty="0" smtClean="0">
+              <a:rPr lang="de-DE" sz="1050" b="1" dirty="0">
                 <a:solidFill>
                   <a:schemeClr val="bg1"/>
                 </a:solidFill>
@@ -1168,7 +1180,7 @@
               <a:t>TRAININGSKARTE</a:t>
             </a:r>
             <a:r>
-              <a:rPr lang="de-DE" sz="1050" dirty="0" smtClean="0">
+              <a:rPr lang="de-DE" sz="1050" dirty="0">
                 <a:solidFill>
                   <a:schemeClr val="bg1"/>
                 </a:solidFill>
@@ -1178,7 +1190,7 @@
               <a:t> </a:t>
             </a:r>
             <a:r>
-              <a:rPr lang="de-DE" sz="1050" b="1" dirty="0" smtClean="0">
+              <a:rPr lang="de-DE" sz="1050" b="1" dirty="0">
                 <a:solidFill>
                   <a:schemeClr val="bg1"/>
                 </a:solidFill>
@@ -1187,13 +1199,6 @@
               </a:rPr>
               <a:t>SCR 03</a:t>
             </a:r>
-            <a:endParaRPr lang="de-DE" sz="1050" b="1" dirty="0">
-              <a:solidFill>
-                <a:schemeClr val="bg1"/>
-              </a:solidFill>
-              <a:latin typeface="Avenir Heavy"/>
-              <a:cs typeface="Avenir Heavy"/>
-            </a:endParaRPr>
           </a:p>
         </p:txBody>
       </p:sp>
@@ -1576,17 +1581,16 @@
           <a:lstStyle/>
           <a:p>
             <a:r>
-              <a:rPr lang="de-DE" dirty="0" smtClean="0">
+              <a:rPr lang="de-DE" dirty="0">
                 <a:latin typeface="Avenir Heavy"/>
                 <a:cs typeface="Avenir Heavy"/>
               </a:rPr>
               <a:t>STÜCK FÜR STÜCK</a:t>
             </a:r>
             <a:r>
-              <a:rPr lang="de-DE" dirty="0" smtClean="0"/>
+              <a:rPr lang="de-DE" dirty="0"/>
               <a:t> EIN STÜCK MUSIK</a:t>
             </a:r>
-            <a:endParaRPr lang="de-DE" dirty="0"/>
           </a:p>
         </p:txBody>
       </p:sp>
@@ -1616,17 +1620,56 @@
                 <a:latin typeface="Avenir Book"/>
                 <a:cs typeface="Avenir Book"/>
               </a:rPr>
-              <a:t>Der Begriff „User Story“ kommt aus der Softwareentwicklung. Er bezeichnet ein Gespräch zwischen Kunden und Entwickler, welche Anforderung der Kunde an die Software stellt. Jede User Story konzentriert sich auf eine bestimmte Funktion der Software und beschreibt sie in Alltagssprache</a:t>
-            </a:r>
-            <a:r>
-              <a:rPr lang="de-DE" dirty="0" smtClean="0">
+              <a:t>Eine „User Story“ bezeichnet in der Softwareentwicklung ein Gespräch zwischen Kunden und Entwickler, welche Anforderung der Kunde an die Software stellt. Jede User Story konzentriert sich auf eine bestimmte Funktion der Software und beschreibt sie in Alltagssprache.</a:t>
+            </a:r>
+          </a:p>
+          <a:p>
+            <a:pPr marL="271463" lvl="0" indent="-271463"/>
+            <a:r>
+              <a:rPr lang="de-DE" dirty="0">
                 <a:solidFill>
                   <a:srgbClr val="747982"/>
                 </a:solidFill>
                 <a:latin typeface="Avenir Book"/>
                 <a:cs typeface="Avenir Book"/>
               </a:rPr>
-              <a:t>.</a:t>
+              <a:t>User Stories werden so klein wie möglich gehalten. So entstehen viele Bausteine, die zusammen eine komplexe Software abbilden. Jede Story wird für sich stehend von den Programmierern bearbeitet und abgeschlossen.</a:t>
+            </a:r>
+          </a:p>
+          <a:p>
+            <a:pPr marL="271463" lvl="0" indent="-271463"/>
+            <a:r>
+              <a:rPr lang="de-DE" dirty="0">
+                <a:solidFill>
+                  <a:srgbClr val="747982"/>
+                </a:solidFill>
+                <a:latin typeface="Avenir Book"/>
+                <a:cs typeface="Avenir Book"/>
+              </a:rPr>
+              <a:t>User Stories geben die Möglichkeit in kleinen Einheiten zu arbeiten und sich nachvollziehbare und erreichbare Ziele für eine Tomate (siehe TOM-01), einen Tag oder eine Woche zu stecken.</a:t>
+            </a:r>
+          </a:p>
+          <a:p>
+            <a:pPr marL="271463" lvl="0" indent="-271463"/>
+            <a:r>
+              <a:rPr lang="de-DE" dirty="0">
+                <a:solidFill>
+                  <a:srgbClr val="747982"/>
+                </a:solidFill>
+                <a:latin typeface="Avenir Book"/>
+                <a:cs typeface="Avenir Book"/>
+              </a:rPr>
+              <a:t>Im Musikstück ist eine User Story vergleichbar mit </a:t>
+            </a:r>
+            <a:r>
+              <a:rPr lang="de-DE">
+                <a:solidFill>
+                  <a:srgbClr val="747982"/>
+                </a:solidFill>
+                <a:latin typeface="Avenir Book"/>
+                <a:cs typeface="Avenir Book"/>
+              </a:rPr>
+              <a:t>einer Phrase.</a:t>
             </a:r>
             <a:endParaRPr lang="de-DE" dirty="0">
               <a:solidFill>
@@ -1646,17 +1689,17 @@
                 <a:latin typeface="Avenir Book"/>
                 <a:cs typeface="Avenir Book"/>
               </a:rPr>
-              <a:t>User </a:t>
-            </a:r>
-            <a:r>
-              <a:rPr lang="de-DE" dirty="0" smtClean="0">
+              <a:t>Phrasen unterteilen ein Stück in Bausteine, deren Komplexität überschaubar ist. Sie sind ungefähr 1 - 8 Takte lang und haben ein klaren Start- und </a:t>
+            </a:r>
+            <a:r>
+              <a:rPr lang="de-DE" dirty="0" err="1">
                 <a:solidFill>
                   <a:srgbClr val="747982"/>
                 </a:solidFill>
                 <a:latin typeface="Avenir Book"/>
                 <a:cs typeface="Avenir Book"/>
               </a:rPr>
-              <a:t>Stories </a:t>
+              <a:t>Endton</a:t>
             </a:r>
             <a:r>
               <a:rPr lang="de-DE" dirty="0">
@@ -1666,20 +1709,30 @@
                 <a:latin typeface="Avenir Book"/>
                 <a:cs typeface="Avenir Book"/>
               </a:rPr>
-              <a:t>werden so klein wie möglich gehalten. So entstehen viele Bausteine, die zusammen eine komplexe Software abbilden. Jede Story wird für sich stehend von den Programmierern bearbeitet und abgeschlossen.</a:t>
+              <a:t>.</a:t>
             </a:r>
           </a:p>
           <a:p>
             <a:pPr marL="271463" lvl="0" indent="-271463"/>
             <a:r>
-              <a:rPr lang="de-DE" dirty="0" smtClean="0">
+              <a:rPr lang="de-DE" dirty="0">
                 <a:solidFill>
                   <a:srgbClr val="747982"/>
                 </a:solidFill>
                 <a:latin typeface="Avenir Book"/>
                 <a:cs typeface="Avenir Book"/>
               </a:rPr>
-              <a:t>User </a:t>
+              <a:t>Mit einer formalen </a:t>
+            </a:r>
+            <a:r>
+              <a:rPr lang="de-DE" dirty="0" err="1">
+                <a:solidFill>
+                  <a:srgbClr val="747982"/>
+                </a:solidFill>
+                <a:latin typeface="Avenir Book"/>
+                <a:cs typeface="Avenir Book"/>
+              </a:rPr>
+              <a:t>Phrasenanalayse</a:t>
             </a:r>
             <a:r>
               <a:rPr lang="de-DE" dirty="0">
@@ -1689,207 +1742,20 @@
                 <a:latin typeface="Avenir Book"/>
                 <a:cs typeface="Avenir Book"/>
               </a:rPr>
-              <a:t>Stories geben die Möglichkeit in kleinen Einheiten zu arbeiten und sich nachvollziehbare und erreichbare Ziele für eine Tomate (siehe TOM-01), einen Tag oder eine Woche zu stecken</a:t>
-            </a:r>
-            <a:r>
-              <a:rPr lang="de-DE" dirty="0" smtClean="0">
+              <a:t> ist es Dir möglich Deine Tomaten taktgenau zu benennen, sodass Deine Zielformulierungen an Präzision gewinnen. Genau wie die Überprüfung Deiner Ziele.</a:t>
+            </a:r>
+          </a:p>
+          <a:p>
+            <a:pPr marL="271463" lvl="0" indent="-271463"/>
+            <a:r>
+              <a:rPr lang="de-DE" dirty="0">
                 <a:solidFill>
                   <a:srgbClr val="747982"/>
                 </a:solidFill>
                 <a:latin typeface="Avenir Book"/>
                 <a:cs typeface="Avenir Book"/>
               </a:rPr>
-              <a:t>.</a:t>
-            </a:r>
-            <a:endParaRPr lang="de-DE" dirty="0">
-              <a:solidFill>
-                <a:srgbClr val="747982"/>
-              </a:solidFill>
-              <a:latin typeface="Avenir Book"/>
-              <a:cs typeface="Avenir Book"/>
-            </a:endParaRPr>
-          </a:p>
-          <a:p>
-            <a:pPr marL="271463" lvl="0" indent="-271463"/>
-            <a:r>
-              <a:rPr lang="de-DE" dirty="0">
-                <a:solidFill>
-                  <a:srgbClr val="747982"/>
-                </a:solidFill>
-                <a:latin typeface="Avenir Book"/>
-                <a:cs typeface="Avenir Book"/>
-              </a:rPr>
-              <a:t>Im Musikstück ist es vergleichbar mit einer Phrase, die vorspielbar ist</a:t>
-            </a:r>
-            <a:r>
-              <a:rPr lang="de-DE" dirty="0" smtClean="0">
-                <a:solidFill>
-                  <a:srgbClr val="747982"/>
-                </a:solidFill>
-                <a:latin typeface="Avenir Book"/>
-                <a:cs typeface="Avenir Book"/>
-              </a:rPr>
-              <a:t>.</a:t>
-            </a:r>
-            <a:endParaRPr lang="de-DE" dirty="0">
-              <a:solidFill>
-                <a:srgbClr val="747982"/>
-              </a:solidFill>
-              <a:latin typeface="Avenir Book"/>
-              <a:cs typeface="Avenir Book"/>
-            </a:endParaRPr>
-          </a:p>
-          <a:p>
-            <a:pPr marL="271463" lvl="0" indent="-271463"/>
-            <a:r>
-              <a:rPr lang="de-DE" dirty="0">
-                <a:solidFill>
-                  <a:srgbClr val="747982"/>
-                </a:solidFill>
-                <a:latin typeface="Avenir Book"/>
-                <a:cs typeface="Avenir Book"/>
-              </a:rPr>
-              <a:t>Die Phrase hat einen klaren Anfang und ein klares Ende, das mit Taktangaben genau definiert werden kann</a:t>
-            </a:r>
-            <a:r>
-              <a:rPr lang="de-DE" dirty="0" smtClean="0">
-                <a:solidFill>
-                  <a:srgbClr val="747982"/>
-                </a:solidFill>
-                <a:latin typeface="Avenir Book"/>
-                <a:cs typeface="Avenir Book"/>
-              </a:rPr>
-              <a:t>.</a:t>
-            </a:r>
-            <a:endParaRPr lang="de-DE" dirty="0">
-              <a:solidFill>
-                <a:srgbClr val="747982"/>
-              </a:solidFill>
-              <a:latin typeface="Avenir Book"/>
-              <a:cs typeface="Avenir Book"/>
-            </a:endParaRPr>
-          </a:p>
-          <a:p>
-            <a:pPr marL="271463" lvl="0" indent="-271463"/>
-            <a:r>
-              <a:rPr lang="de-DE" dirty="0">
-                <a:solidFill>
-                  <a:srgbClr val="747982"/>
-                </a:solidFill>
-                <a:latin typeface="Avenir Book"/>
-                <a:cs typeface="Avenir Book"/>
-              </a:rPr>
-              <a:t>Phrasen unterteilen ein Stück in Bausteine, deren Komplexität überschaubar ist. Sie sind ungefähr 1 - 8 Takte lang</a:t>
-            </a:r>
-            <a:r>
-              <a:rPr lang="de-DE" dirty="0" smtClean="0">
-                <a:solidFill>
-                  <a:srgbClr val="747982"/>
-                </a:solidFill>
-                <a:latin typeface="Avenir Book"/>
-                <a:cs typeface="Avenir Book"/>
-              </a:rPr>
-              <a:t>.</a:t>
-            </a:r>
-            <a:endParaRPr lang="de-DE" dirty="0">
-              <a:solidFill>
-                <a:srgbClr val="747982"/>
-              </a:solidFill>
-              <a:latin typeface="Avenir Book"/>
-              <a:cs typeface="Avenir Book"/>
-            </a:endParaRPr>
-          </a:p>
-          <a:p>
-            <a:pPr marL="271463" lvl="0" indent="-271463"/>
-            <a:r>
-              <a:rPr lang="de-DE" dirty="0">
-                <a:solidFill>
-                  <a:srgbClr val="747982"/>
-                </a:solidFill>
-                <a:latin typeface="Avenir Book"/>
-                <a:cs typeface="Avenir Book"/>
-              </a:rPr>
-              <a:t>Mit einer formalen </a:t>
-            </a:r>
-            <a:r>
-              <a:rPr lang="de-DE" dirty="0" err="1" smtClean="0">
-                <a:solidFill>
-                  <a:srgbClr val="747982"/>
-                </a:solidFill>
-                <a:latin typeface="Avenir Book"/>
-                <a:cs typeface="Avenir Book"/>
-              </a:rPr>
-              <a:t>Phrasenanalayse</a:t>
-            </a:r>
-            <a:r>
-              <a:rPr lang="de-DE" dirty="0" smtClean="0">
-                <a:solidFill>
-                  <a:srgbClr val="747982"/>
-                </a:solidFill>
-                <a:latin typeface="Avenir Book"/>
-                <a:cs typeface="Avenir Book"/>
-              </a:rPr>
-              <a:t> </a:t>
-            </a:r>
-            <a:r>
-              <a:rPr lang="de-DE" dirty="0">
-                <a:solidFill>
-                  <a:srgbClr val="747982"/>
-                </a:solidFill>
-                <a:latin typeface="Avenir Book"/>
-                <a:cs typeface="Avenir Book"/>
-              </a:rPr>
-              <a:t>ist es Dir möglich Deine Tomaten taktgenau zu benennen, sodass Deine Zielformulierungen an Präzision gewinnen. Genau wie die Überprüfung Deiner Ziele</a:t>
-            </a:r>
-            <a:r>
-              <a:rPr lang="de-DE" dirty="0" smtClean="0">
-                <a:solidFill>
-                  <a:srgbClr val="747982"/>
-                </a:solidFill>
-                <a:latin typeface="Avenir Book"/>
-                <a:cs typeface="Avenir Book"/>
-              </a:rPr>
-              <a:t>.</a:t>
-            </a:r>
-            <a:endParaRPr lang="de-DE" dirty="0">
-              <a:solidFill>
-                <a:srgbClr val="747982"/>
-              </a:solidFill>
-              <a:latin typeface="Avenir Book"/>
-              <a:cs typeface="Avenir Book"/>
-            </a:endParaRPr>
-          </a:p>
-          <a:p>
-            <a:pPr marL="271463" lvl="0" indent="-271463"/>
-            <a:r>
-              <a:rPr lang="de-DE" dirty="0">
-                <a:solidFill>
-                  <a:srgbClr val="747982"/>
-                </a:solidFill>
-                <a:latin typeface="Avenir Book"/>
-                <a:cs typeface="Avenir Book"/>
-              </a:rPr>
-              <a:t>Mit dem „Phrasendiagramm“ kannst Du diese Analyse auf eine Übersicht geben. Du erkennst durch die formale Analyse wie viele Phrasen das Stück hat und welche Phrasen sich in dem Stück wiederholen und an anderer </a:t>
-            </a:r>
-            <a:r>
-              <a:rPr lang="de-DE" dirty="0" smtClean="0">
-                <a:solidFill>
-                  <a:srgbClr val="747982"/>
-                </a:solidFill>
-                <a:latin typeface="Avenir Book"/>
-                <a:cs typeface="Avenir Book"/>
-              </a:rPr>
-              <a:t>Stelle </a:t>
-            </a:r>
-            <a:r>
-              <a:rPr lang="de-DE" dirty="0">
-                <a:solidFill>
-                  <a:srgbClr val="747982"/>
-                </a:solidFill>
-                <a:latin typeface="Avenir Book"/>
-                <a:cs typeface="Avenir Book"/>
-              </a:rPr>
-              <a:t>nochmals auftauchen.</a:t>
+              <a:t>Mit dem „Phrasendiagramm“ kannst Du diese Analyse auf eine Übersicht geben. Du erkennst durch die formale Analyse wie viele Phrasen das Stück hat und welche Phrasen sich in dem Stück wiederholen und an anderer Stelle nochmals auftauchen.</a:t>
             </a:r>
           </a:p>
         </p:txBody>
@@ -1913,9 +1779,40 @@
               <a:buNone/>
             </a:pPr>
             <a:r>
-              <a:rPr lang="de-DE" dirty="0" smtClean="0"/>
+              <a:rPr lang="de-DE" dirty="0"/>
               <a:t>Regina Brandhuber</a:t>
             </a:r>
+          </a:p>
+        </p:txBody>
+      </p:sp>
+      <p:sp>
+        <p:nvSpPr>
+          <p:cNvPr id="5" name="Textfeld 4">
+            <a:extLst>
+              <a:ext uri="{FF2B5EF4-FFF2-40B4-BE49-F238E27FC236}">
+                <a16:creationId xmlns:a16="http://schemas.microsoft.com/office/drawing/2014/main" id="{CAE6C346-13D9-8146-9D67-939543EC7178}"/>
+              </a:ext>
+            </a:extLst>
+          </p:cNvPr>
+          <p:cNvSpPr txBox="1"/>
+          <p:nvPr/>
+        </p:nvSpPr>
+        <p:spPr>
+          <a:xfrm>
+            <a:off x="890337" y="1098884"/>
+            <a:ext cx="184731" cy="338554"/>
+          </a:xfrm>
+          <a:prstGeom prst="rect">
+            <a:avLst/>
+          </a:prstGeom>
+          <a:noFill/>
+        </p:spPr>
+        <p:txBody>
+          <a:bodyPr wrap="none" rtlCol="0">
+            <a:spAutoFit/>
+          </a:bodyPr>
+          <a:lstStyle/>
+          <a:p>
             <a:endParaRPr lang="de-DE" dirty="0"/>
           </a:p>
         </p:txBody>
@@ -1967,15 +1864,18 @@
           <a:p>
             <a:pPr marL="271463" indent="-271463"/>
             <a:r>
-              <a:rPr lang="de-DE" dirty="0" smtClean="0">
+              <a:rPr lang="de-DE" dirty="0">
                 <a:solidFill>
                   <a:srgbClr val="747982"/>
                 </a:solidFill>
                 <a:latin typeface="Avenir Book"/>
                 <a:cs typeface="Avenir Book"/>
               </a:rPr>
-              <a:t>Analysiere </a:t>
-            </a:r>
+              <a:t>Analysiere in 2 Wochen 2 Stücke mit dem Phrasendiagramm</a:t>
+            </a:r>
+          </a:p>
+          <a:p>
+            <a:pPr marL="271463" indent="-271463"/>
             <a:r>
               <a:rPr lang="de-DE" dirty="0">
                 <a:solidFill>
@@ -1984,17 +1884,70 @@
                 <a:latin typeface="Avenir Book"/>
                 <a:cs typeface="Avenir Book"/>
               </a:rPr>
-              <a:t>in 2 Wochen 2 Stücke mit dem </a:t>
-            </a:r>
-            <a:r>
-              <a:rPr lang="de-DE" dirty="0" smtClean="0">
+              <a:t>Trage  alle Phrasen in einem Stück im Phrasendiagramm ein und gib ihnen genaue Taktangaben. </a:t>
+            </a:r>
+          </a:p>
+          <a:p>
+            <a:pPr marL="271463" indent="-271463"/>
+            <a:r>
+              <a:rPr lang="de-DE" dirty="0">
                 <a:solidFill>
                   <a:srgbClr val="747982"/>
                 </a:solidFill>
                 <a:latin typeface="Avenir Book"/>
                 <a:cs typeface="Avenir Book"/>
               </a:rPr>
-              <a:t>Phrasendiagramm</a:t>
+              <a:t>Zeige Deinem Team Deine ausgefüllten </a:t>
+            </a:r>
+            <a:r>
+              <a:rPr lang="de-DE">
+                <a:solidFill>
+                  <a:srgbClr val="747982"/>
+                </a:solidFill>
+                <a:latin typeface="Avenir Book"/>
+                <a:cs typeface="Avenir Book"/>
+              </a:rPr>
+              <a:t>Phrasendiagramme un</a:t>
+            </a:r>
+            <a:r>
+              <a:rPr lang="de-DE" dirty="0">
+                <a:solidFill>
+                  <a:srgbClr val="747982"/>
+                </a:solidFill>
+                <a:latin typeface="Avenir Book"/>
+                <a:cs typeface="Avenir Book"/>
+              </a:rPr>
+              <a:t>d</a:t>
+            </a:r>
+            <a:r>
+              <a:rPr lang="de-DE">
+                <a:solidFill>
+                  <a:srgbClr val="747982"/>
+                </a:solidFill>
+                <a:latin typeface="Avenir Book"/>
+                <a:cs typeface="Avenir Book"/>
+              </a:rPr>
+              <a:t> </a:t>
+            </a:r>
+            <a:r>
+              <a:rPr lang="de-DE" dirty="0">
+                <a:solidFill>
+                  <a:srgbClr val="747982"/>
+                </a:solidFill>
+                <a:latin typeface="Avenir Book"/>
+                <a:cs typeface="Avenir Book"/>
+              </a:rPr>
+              <a:t>besprich </a:t>
+            </a:r>
+            <a:r>
+              <a:rPr lang="de-DE">
+                <a:solidFill>
+                  <a:srgbClr val="747982"/>
+                </a:solidFill>
+                <a:latin typeface="Avenir Book"/>
+                <a:cs typeface="Avenir Book"/>
+              </a:rPr>
+              <a:t>Deine Erfahrungen.</a:t>
             </a:r>
             <a:endParaRPr lang="de-DE" dirty="0">
               <a:solidFill>
@@ -2003,72 +1956,6 @@
               <a:latin typeface="Avenir Book"/>
               <a:cs typeface="Avenir Book"/>
             </a:endParaRPr>
-          </a:p>
-          <a:p>
-            <a:pPr marL="271463" indent="-271463"/>
-            <a:r>
-              <a:rPr lang="de-DE" dirty="0">
-                <a:solidFill>
-                  <a:srgbClr val="747982"/>
-                </a:solidFill>
-                <a:latin typeface="Avenir Book"/>
-                <a:cs typeface="Avenir Book"/>
-              </a:rPr>
-              <a:t>Trage  alle Phrasen in einem Stück </a:t>
-            </a:r>
-            <a:r>
-              <a:rPr lang="de-DE" smtClean="0">
-                <a:solidFill>
-                  <a:srgbClr val="747982"/>
-                </a:solidFill>
-                <a:latin typeface="Avenir Book"/>
-                <a:cs typeface="Avenir Book"/>
-              </a:rPr>
-              <a:t>im Phrasendiagramm </a:t>
-            </a:r>
-            <a:r>
-              <a:rPr lang="de-DE" dirty="0">
-                <a:solidFill>
-                  <a:srgbClr val="747982"/>
-                </a:solidFill>
-                <a:latin typeface="Avenir Book"/>
-                <a:cs typeface="Avenir Book"/>
-              </a:rPr>
-              <a:t>ein und gib ihnen genaue Taktangaben. </a:t>
-            </a:r>
-          </a:p>
-          <a:p>
-            <a:pPr marL="271463" indent="-271463"/>
-            <a:r>
-              <a:rPr lang="de-DE" dirty="0">
-                <a:solidFill>
-                  <a:srgbClr val="747982"/>
-                </a:solidFill>
-                <a:latin typeface="Avenir Book"/>
-                <a:cs typeface="Avenir Book"/>
-              </a:rPr>
-              <a:t>Zeige Deinem Team Deine ausgefüllten </a:t>
-            </a:r>
-            <a:r>
-              <a:rPr lang="de-DE" dirty="0" smtClean="0">
-                <a:solidFill>
-                  <a:srgbClr val="747982"/>
-                </a:solidFill>
-                <a:latin typeface="Avenir Book"/>
-                <a:cs typeface="Avenir Book"/>
-              </a:rPr>
-              <a:t>Phrasendiagramme</a:t>
-            </a:r>
-            <a:r>
-              <a:rPr lang="de-DE" dirty="0">
-                <a:solidFill>
-                  <a:srgbClr val="747982"/>
-                </a:solidFill>
-                <a:latin typeface="Avenir Book"/>
-                <a:cs typeface="Avenir Book"/>
-              </a:rPr>
-              <a:t>, besprich Deine Erfahrungen und lass Dich so vom Team zertifizieren.</a:t>
-            </a:r>
           </a:p>
         </p:txBody>
       </p:sp>

</xml_diff>

<commit_message>
SCR 03 neue Lizenz eingepflegt
</commit_message>
<xml_diff>
--- a/training-cards/music moves/Scrum (SCR)/ger/apprentice/ger_SCR_03_stueck_fuer_stueck_ein_stueck_musik_MM_A.pptx
+++ b/training-cards/music moves/Scrum (SCR)/ger/apprentice/ger_SCR_03_stueck_fuer_stueck_ein_stueck_musik_MM_A.pptx
@@ -512,14 +512,20 @@
       </p:pic>
       <p:sp>
         <p:nvSpPr>
-          <p:cNvPr id="5" name="Shape 7"/>
+          <p:cNvPr id="4" name="Shape 7">
+            <a:extLst>
+              <a:ext uri="{FF2B5EF4-FFF2-40B4-BE49-F238E27FC236}">
+                <a16:creationId xmlns:a16="http://schemas.microsoft.com/office/drawing/2014/main" id="{8051713C-209A-43FF-DDE2-E8614C70B4A8}"/>
+              </a:ext>
+            </a:extLst>
+          </p:cNvPr>
           <p:cNvSpPr/>
           <p:nvPr userDrawn="1"/>
         </p:nvSpPr>
         <p:spPr>
           <a:xfrm>
-            <a:off x="1683417" y="4952581"/>
-            <a:ext cx="4196016" cy="276995"/>
+            <a:off x="971550" y="4689585"/>
+            <a:ext cx="4691860" cy="461661"/>
           </a:xfrm>
           <a:prstGeom prst="rect">
             <a:avLst/>
@@ -534,7 +540,7 @@
           </a:extLst>
         </p:spPr>
         <p:txBody>
-          <a:bodyPr wrap="none" lIns="45718" tIns="45718" rIns="45718" bIns="45718">
+          <a:bodyPr wrap="square" lIns="45718" tIns="45718" rIns="45718" bIns="45718">
             <a:spAutoFit/>
           </a:bodyPr>
           <a:lstStyle/>
@@ -543,49 +549,266 @@
               <a:defRPr sz="1800"/>
             </a:pPr>
             <a:r>
-              <a:rPr sz="600" dirty="0">
-                <a:latin typeface="Avenir Light"/>
+              <a:rPr lang="de-DE" sz="800" b="0" i="0" u="none" strike="noStrike" dirty="0" err="1">
+                <a:solidFill>
+                  <a:schemeClr val="tx1">
+                    <a:lumMod val="65000"/>
+                    <a:lumOff val="35000"/>
+                  </a:schemeClr>
+                </a:solidFill>
+                <a:effectLst/>
+                <a:latin typeface="Avenir Book" panose="02000503020000020003" pitchFamily="2" charset="0"/>
+              </a:rPr>
+              <a:t>music</a:t>
+            </a:r>
+            <a:r>
+              <a:rPr lang="de-DE" sz="800" b="0" i="0" u="none" strike="noStrike" dirty="0">
+                <a:solidFill>
+                  <a:schemeClr val="tx1">
+                    <a:lumMod val="65000"/>
+                    <a:lumOff val="35000"/>
+                  </a:schemeClr>
+                </a:solidFill>
+                <a:effectLst/>
+                <a:latin typeface="Avenir Book" panose="02000503020000020003" pitchFamily="2" charset="0"/>
+              </a:rPr>
+              <a:t> </a:t>
+            </a:r>
+            <a:r>
+              <a:rPr lang="de-DE" sz="800" b="0" i="0" u="none" strike="noStrike" dirty="0" err="1">
+                <a:solidFill>
+                  <a:schemeClr val="tx1">
+                    <a:lumMod val="65000"/>
+                    <a:lumOff val="35000"/>
+                  </a:schemeClr>
+                </a:solidFill>
+                <a:effectLst/>
+                <a:latin typeface="Avenir Book" panose="02000503020000020003" pitchFamily="2" charset="0"/>
+              </a:rPr>
+              <a:t>moves</a:t>
+            </a:r>
+            <a:r>
+              <a:rPr lang="de-DE" sz="800" b="0" i="0" u="none" strike="noStrike" dirty="0">
+                <a:solidFill>
+                  <a:schemeClr val="tx1">
+                    <a:lumMod val="65000"/>
+                    <a:lumOff val="35000"/>
+                  </a:schemeClr>
+                </a:solidFill>
+                <a:effectLst/>
+                <a:latin typeface="Avenir Book" panose="02000503020000020003" pitchFamily="2" charset="0"/>
+              </a:rPr>
+              <a:t>-Trainingskarten von Regina Brandhuber sind lizenziert unter einer Creative Commons </a:t>
+            </a:r>
+          </a:p>
+          <a:p>
+            <a:pPr lvl="0" algn="ctr">
+              <a:defRPr sz="1800"/>
+            </a:pPr>
+            <a:r>
+              <a:rPr lang="de-DE" sz="800" b="0" i="0" u="none" strike="noStrike" dirty="0">
+                <a:solidFill>
+                  <a:schemeClr val="tx1">
+                    <a:lumMod val="65000"/>
+                    <a:lumOff val="35000"/>
+                  </a:schemeClr>
+                </a:solidFill>
+                <a:effectLst/>
+                <a:latin typeface="Avenir Book" panose="02000503020000020003" pitchFamily="2" charset="0"/>
+              </a:rPr>
+              <a:t>Namensnennung-Nicht kommerziell 4.0 International Lizenz.</a:t>
+            </a:r>
+          </a:p>
+          <a:p>
+            <a:pPr lvl="0" algn="ctr">
+              <a:defRPr sz="1800"/>
+            </a:pPr>
+            <a:r>
+              <a:rPr lang="de-DE" sz="800" dirty="0">
+                <a:solidFill>
+                  <a:schemeClr val="tx1">
+                    <a:lumMod val="65000"/>
+                    <a:lumOff val="35000"/>
+                  </a:schemeClr>
+                </a:solidFill>
+                <a:latin typeface="Avenir Book" panose="02000503020000020003" pitchFamily="2" charset="0"/>
                 <a:ea typeface="Calibri"/>
                 <a:cs typeface="Avenir Light"/>
                 <a:sym typeface="Calibri"/>
               </a:rPr>
-              <a:t>This work is licensed under the Creative Commons Attribution-NonCommercial-NoDerivatives 4.0 International License. </a:t>
-            </a:r>
-          </a:p>
-          <a:p>
-            <a:pPr lvl="0" algn="ctr">
-              <a:defRPr sz="1800"/>
-            </a:pPr>
-            <a:r>
-              <a:rPr sz="600" dirty="0">
-                <a:latin typeface="Avenir Light"/>
+              <a:t>Nachzulesen unter:</a:t>
+            </a:r>
+            <a:r>
+              <a:rPr sz="800" dirty="0">
+                <a:solidFill>
+                  <a:schemeClr val="tx1">
+                    <a:lumMod val="65000"/>
+                    <a:lumOff val="35000"/>
+                  </a:schemeClr>
+                </a:solidFill>
+                <a:latin typeface="Avenir Book" panose="02000503020000020003" pitchFamily="2" charset="0"/>
                 <a:ea typeface="Calibri"/>
                 <a:cs typeface="Avenir Light"/>
                 <a:sym typeface="Calibri"/>
               </a:rPr>
-              <a:t>To view a copy of this license, visit http://creativecommons.org/licenses/by-nc-nd/4.0/.</a:t>
-            </a:r>
+              <a:t> </a:t>
+            </a:r>
+            <a:r>
+              <a:rPr lang="de-DE" sz="800" dirty="0">
+                <a:solidFill>
+                  <a:schemeClr val="tx1">
+                    <a:lumMod val="65000"/>
+                    <a:lumOff val="35000"/>
+                  </a:schemeClr>
+                </a:solidFill>
+                <a:latin typeface="Avenir Book" panose="02000503020000020003" pitchFamily="2" charset="0"/>
+                <a:ea typeface="Calibri"/>
+                <a:cs typeface="Avenir Light"/>
+                <a:sym typeface="Calibri"/>
+              </a:rPr>
+              <a:t>https://</a:t>
+            </a:r>
+            <a:r>
+              <a:rPr lang="de-DE" sz="800" dirty="0" err="1">
+                <a:solidFill>
+                  <a:schemeClr val="tx1">
+                    <a:lumMod val="65000"/>
+                    <a:lumOff val="35000"/>
+                  </a:schemeClr>
+                </a:solidFill>
+                <a:latin typeface="Avenir Book" panose="02000503020000020003" pitchFamily="2" charset="0"/>
+                <a:ea typeface="Calibri"/>
+                <a:cs typeface="Avenir Light"/>
+                <a:sym typeface="Calibri"/>
+              </a:rPr>
+              <a:t>creativecommons.org</a:t>
+            </a:r>
+            <a:r>
+              <a:rPr lang="de-DE" sz="800" dirty="0">
+                <a:solidFill>
+                  <a:schemeClr val="tx1">
+                    <a:lumMod val="65000"/>
+                    <a:lumOff val="35000"/>
+                  </a:schemeClr>
+                </a:solidFill>
+                <a:latin typeface="Avenir Book" panose="02000503020000020003" pitchFamily="2" charset="0"/>
+                <a:ea typeface="Calibri"/>
+                <a:cs typeface="Avenir Light"/>
+                <a:sym typeface="Calibri"/>
+              </a:rPr>
+              <a:t>/</a:t>
+            </a:r>
+            <a:r>
+              <a:rPr lang="de-DE" sz="800" dirty="0" err="1">
+                <a:solidFill>
+                  <a:schemeClr val="tx1">
+                    <a:lumMod val="65000"/>
+                    <a:lumOff val="35000"/>
+                  </a:schemeClr>
+                </a:solidFill>
+                <a:latin typeface="Avenir Book" panose="02000503020000020003" pitchFamily="2" charset="0"/>
+                <a:ea typeface="Calibri"/>
+                <a:cs typeface="Avenir Light"/>
+                <a:sym typeface="Calibri"/>
+              </a:rPr>
+              <a:t>licenses</a:t>
+            </a:r>
+            <a:r>
+              <a:rPr lang="de-DE" sz="800" dirty="0">
+                <a:solidFill>
+                  <a:schemeClr val="tx1">
+                    <a:lumMod val="65000"/>
+                    <a:lumOff val="35000"/>
+                  </a:schemeClr>
+                </a:solidFill>
+                <a:latin typeface="Avenir Book" panose="02000503020000020003" pitchFamily="2" charset="0"/>
+                <a:ea typeface="Calibri"/>
+                <a:cs typeface="Avenir Light"/>
+                <a:sym typeface="Calibri"/>
+              </a:rPr>
+              <a:t>/</a:t>
+            </a:r>
+            <a:r>
+              <a:rPr lang="de-DE" sz="800" dirty="0" err="1">
+                <a:solidFill>
+                  <a:schemeClr val="tx1">
+                    <a:lumMod val="65000"/>
+                    <a:lumOff val="35000"/>
+                  </a:schemeClr>
+                </a:solidFill>
+                <a:latin typeface="Avenir Book" panose="02000503020000020003" pitchFamily="2" charset="0"/>
+                <a:ea typeface="Calibri"/>
+                <a:cs typeface="Avenir Light"/>
+                <a:sym typeface="Calibri"/>
+              </a:rPr>
+              <a:t>by-nc</a:t>
+            </a:r>
+            <a:r>
+              <a:rPr lang="de-DE" sz="800" dirty="0">
+                <a:solidFill>
+                  <a:schemeClr val="tx1">
+                    <a:lumMod val="65000"/>
+                    <a:lumOff val="35000"/>
+                  </a:schemeClr>
+                </a:solidFill>
+                <a:latin typeface="Avenir Book" panose="02000503020000020003" pitchFamily="2" charset="0"/>
+                <a:ea typeface="Calibri"/>
+                <a:cs typeface="Avenir Light"/>
+                <a:sym typeface="Calibri"/>
+              </a:rPr>
+              <a:t>/4.0/</a:t>
+            </a:r>
+            <a:r>
+              <a:rPr lang="de-DE" sz="800" dirty="0" err="1">
+                <a:solidFill>
+                  <a:schemeClr val="tx1">
+                    <a:lumMod val="65000"/>
+                    <a:lumOff val="35000"/>
+                  </a:schemeClr>
+                </a:solidFill>
+                <a:latin typeface="Avenir Book" panose="02000503020000020003" pitchFamily="2" charset="0"/>
+                <a:ea typeface="Calibri"/>
+                <a:cs typeface="Avenir Light"/>
+                <a:sym typeface="Calibri"/>
+              </a:rPr>
+              <a:t>deed.de</a:t>
+            </a:r>
+            <a:endParaRPr sz="800" dirty="0">
+              <a:solidFill>
+                <a:schemeClr val="tx1">
+                  <a:lumMod val="65000"/>
+                  <a:lumOff val="35000"/>
+                </a:schemeClr>
+              </a:solidFill>
+              <a:latin typeface="Avenir Book" panose="02000503020000020003" pitchFamily="2" charset="0"/>
+              <a:ea typeface="Calibri"/>
+              <a:cs typeface="Avenir Light"/>
+              <a:sym typeface="Calibri"/>
+            </a:endParaRPr>
           </a:p>
         </p:txBody>
       </p:sp>
       <p:pic>
         <p:nvPicPr>
-          <p:cNvPr id="6" name="pasted-image.tif"/>
+          <p:cNvPr id="8" name="pasted-image.tif">
+            <a:extLst>
+              <a:ext uri="{FF2B5EF4-FFF2-40B4-BE49-F238E27FC236}">
+                <a16:creationId xmlns:a16="http://schemas.microsoft.com/office/drawing/2014/main" id="{C838D3D1-5DC7-A963-1537-56291F240311}"/>
+              </a:ext>
+            </a:extLst>
+          </p:cNvPr>
           <p:cNvPicPr/>
           <p:nvPr userDrawn="1"/>
         </p:nvPicPr>
-        <p:blipFill>
-          <a:blip r:embed="rId4">
-            <a:extLst/>
-          </a:blip>
-          <a:stretch>
-            <a:fillRect/>
-          </a:stretch>
+        <p:blipFill rotWithShape="1">
+          <a:blip r:embed="rId4"/>
+          <a:srcRect r="24777" b="-3233"/>
+          <a:stretch/>
         </p:blipFill>
         <p:spPr>
           <a:xfrm>
-            <a:off x="6174185" y="4992838"/>
-            <a:ext cx="886619" cy="214128"/>
+            <a:off x="5724347" y="4733926"/>
+            <a:ext cx="1009828" cy="333374"/>
           </a:xfrm>
           <a:prstGeom prst="rect">
             <a:avLst/>
@@ -595,58 +818,6 @@
           </a:ln>
         </p:spPr>
       </p:pic>
-      <p:sp>
-        <p:nvSpPr>
-          <p:cNvPr id="7" name="Textfeld 6"/>
-          <p:cNvSpPr txBox="1"/>
-          <p:nvPr userDrawn="1"/>
-        </p:nvSpPr>
-        <p:spPr>
-          <a:xfrm>
-            <a:off x="239285" y="4936890"/>
-            <a:ext cx="1044856" cy="276999"/>
-          </a:xfrm>
-          <a:prstGeom prst="rect">
-            <a:avLst/>
-          </a:prstGeom>
-          <a:noFill/>
-        </p:spPr>
-        <p:txBody>
-          <a:bodyPr wrap="square" rtlCol="0">
-            <a:spAutoFit/>
-          </a:bodyPr>
-          <a:lstStyle/>
-          <a:p>
-            <a:r>
-              <a:rPr lang="de-DE" sz="600" dirty="0">
-                <a:solidFill>
-                  <a:srgbClr val="5D5E5F"/>
-                </a:solidFill>
-                <a:latin typeface="Avenir Light"/>
-                <a:cs typeface="Avenir Light"/>
-              </a:rPr>
-              <a:t>Letzte Änderung: </a:t>
-            </a:r>
-            <a:fld id="{7A8C7DAC-E536-564C-B5B3-90E8FAB50562}" type="datetime1">
-              <a:rPr lang="de-DE" sz="600" smtClean="0">
-                <a:solidFill>
-                  <a:srgbClr val="5D5E5F"/>
-                </a:solidFill>
-                <a:latin typeface="Avenir Light"/>
-                <a:cs typeface="Avenir Light"/>
-              </a:rPr>
-              <a:t>27.11.18</a:t>
-            </a:fld>
-            <a:endParaRPr lang="de-DE" sz="600" dirty="0">
-              <a:solidFill>
-                <a:srgbClr val="5D5E5F"/>
-              </a:solidFill>
-              <a:latin typeface="Avenir Light"/>
-              <a:cs typeface="Avenir Light"/>
-            </a:endParaRPr>
-          </a:p>
-        </p:txBody>
-      </p:sp>
     </p:spTree>
     <p:extLst>
       <p:ext uri="{BB962C8B-B14F-4D97-AF65-F5344CB8AC3E}">
@@ -716,7 +887,7 @@
           <a:p>
             <a:fld id="{FF5B2BAF-DF38-0A48-A798-0C06E514FD52}" type="datetimeFigureOut">
               <a:rPr lang="de-DE" smtClean="0"/>
-              <a:t>27.11.18</a:t>
+              <a:t>23.07.23</a:t>
             </a:fld>
             <a:endParaRPr lang="de-DE" dirty="0"/>
           </a:p>
@@ -936,7 +1107,7 @@
           <a:p>
             <a:fld id="{FF5B2BAF-DF38-0A48-A798-0C06E514FD52}" type="datetimeFigureOut">
               <a:rPr lang="de-DE" smtClean="0"/>
-              <a:t>27.11.18</a:t>
+              <a:t>23.07.23</a:t>
             </a:fld>
             <a:endParaRPr lang="de-DE" dirty="0"/>
           </a:p>
@@ -1884,7 +2055,7 @@
                 <a:latin typeface="Avenir Book"/>
                 <a:cs typeface="Avenir Book"/>
               </a:rPr>
-              <a:t>Trage  alle Phrasen in einem Stück im Phrasendiagramm ein und gib ihnen genaue Taktangaben. </a:t>
+              <a:t>Trage alle Phrasen in einem Stück im Phrasendiagramm ein und gib ihnen genaue Taktangaben. </a:t>
             </a:r>
           </a:p>
           <a:p>
@@ -1897,65 +2068,8 @@
                 <a:latin typeface="Avenir Book"/>
                 <a:cs typeface="Avenir Book"/>
               </a:rPr>
-              <a:t>Zeige Deinem Team Deine ausgefüllten </a:t>
-            </a:r>
-            <a:r>
-              <a:rPr lang="de-DE">
-                <a:solidFill>
-                  <a:srgbClr val="747982"/>
-                </a:solidFill>
-                <a:latin typeface="Avenir Book"/>
-                <a:cs typeface="Avenir Book"/>
-              </a:rPr>
-              <a:t>Phrasendiagramme un</a:t>
-            </a:r>
-            <a:r>
-              <a:rPr lang="de-DE" dirty="0">
-                <a:solidFill>
-                  <a:srgbClr val="747982"/>
-                </a:solidFill>
-                <a:latin typeface="Avenir Book"/>
-                <a:cs typeface="Avenir Book"/>
-              </a:rPr>
-              <a:t>d</a:t>
-            </a:r>
-            <a:r>
-              <a:rPr lang="de-DE">
-                <a:solidFill>
-                  <a:srgbClr val="747982"/>
-                </a:solidFill>
-                <a:latin typeface="Avenir Book"/>
-                <a:cs typeface="Avenir Book"/>
-              </a:rPr>
-              <a:t> </a:t>
-            </a:r>
-            <a:r>
-              <a:rPr lang="de-DE" dirty="0">
-                <a:solidFill>
-                  <a:srgbClr val="747982"/>
-                </a:solidFill>
-                <a:latin typeface="Avenir Book"/>
-                <a:cs typeface="Avenir Book"/>
-              </a:rPr>
-              <a:t>besprich </a:t>
-            </a:r>
-            <a:r>
-              <a:rPr lang="de-DE">
-                <a:solidFill>
-                  <a:srgbClr val="747982"/>
-                </a:solidFill>
-                <a:latin typeface="Avenir Book"/>
-                <a:cs typeface="Avenir Book"/>
-              </a:rPr>
-              <a:t>Deine Erfahrungen.</a:t>
-            </a:r>
-            <a:endParaRPr lang="de-DE" dirty="0">
-              <a:solidFill>
-                <a:srgbClr val="747982"/>
-              </a:solidFill>
-              <a:latin typeface="Avenir Book"/>
-              <a:cs typeface="Avenir Book"/>
-            </a:endParaRPr>
+              <a:t>Zeige Deinem Team Deine ausgefüllten Phrasendiagramme und besprich Deine Erfahrungen.</a:t>
+            </a:r>
           </a:p>
         </p:txBody>
       </p:sp>

</xml_diff>

<commit_message>
SCR 03 Blocksatz und Quellen
</commit_message>
<xml_diff>
--- a/training-cards/music moves/Scrum (SCR)/ger/apprentice/ger_SCR_03_stueck_fuer_stueck_ein_stueck_musik_MM_A.pptx
+++ b/training-cards/music moves/Scrum (SCR)/ger/apprentice/ger_SCR_03_stueck_fuer_stueck_ein_stueck_musik_MM_A.pptx
@@ -535,7 +535,7 @@
           </a:ln>
           <a:extLst>
             <a:ext uri="{C572A759-6A51-4108-AA02-DFA0A04FC94B}">
-              <ma14:wrappingTextBoxFlag xmlns="" xmlns:ma14="http://schemas.microsoft.com/office/mac/drawingml/2011/main" val="1"/>
+              <ma14:wrappingTextBoxFlag xmlns:ma14="http://schemas.microsoft.com/office/mac/drawingml/2011/main" xmlns="" val="1"/>
             </a:ext>
           </a:extLst>
         </p:spPr>
@@ -887,7 +887,7 @@
           <a:p>
             <a:fld id="{FF5B2BAF-DF38-0A48-A798-0C06E514FD52}" type="datetimeFigureOut">
               <a:rPr lang="de-DE" smtClean="0"/>
-              <a:t>23.07.23</a:t>
+              <a:t>02.08.24</a:t>
             </a:fld>
             <a:endParaRPr lang="de-DE" dirty="0"/>
           </a:p>
@@ -1107,7 +1107,7 @@
           <a:p>
             <a:fld id="{FF5B2BAF-DF38-0A48-A798-0C06E514FD52}" type="datetimeFigureOut">
               <a:rPr lang="de-DE" smtClean="0"/>
-              <a:t>23.07.23</a:t>
+              <a:t>02.08.24</a:t>
             </a:fld>
             <a:endParaRPr lang="de-DE" dirty="0"/>
           </a:p>
@@ -1775,14 +1775,19 @@
             <p:ph idx="13"/>
           </p:nvPr>
         </p:nvSpPr>
-        <p:spPr/>
+        <p:spPr>
+          <a:xfrm>
+            <a:off x="858838" y="1568452"/>
+            <a:ext cx="6011545" cy="3470273"/>
+          </a:xfrm>
+        </p:spPr>
         <p:txBody>
           <a:bodyPr>
             <a:noAutofit/>
           </a:bodyPr>
           <a:lstStyle/>
           <a:p>
-            <a:pPr marL="271463" lvl="0" indent="-271463"/>
+            <a:pPr marL="271463" lvl="0" indent="-271463" algn="just"/>
             <a:r>
               <a:rPr lang="de-DE" dirty="0">
                 <a:solidFill>
@@ -1791,11 +1796,11 @@
                 <a:latin typeface="Avenir Book"/>
                 <a:cs typeface="Avenir Book"/>
               </a:rPr>
-              <a:t>Eine „User Story“ bezeichnet in der Softwareentwicklung ein Gespräch zwischen Kunden und Entwickler, welche Anforderung der Kunde an die Software stellt. Jede User Story konzentriert sich auf eine bestimmte Funktion der Software und beschreibt sie in Alltagssprache.</a:t>
-            </a:r>
-          </a:p>
-          <a:p>
-            <a:pPr marL="271463" lvl="0" indent="-271463"/>
+              <a:t>Eine sog. „User Story“ (vgl. Cohn2004) ist ein Format für Anforderungen, die an eine Software gestellt werden. Auf der User Story werden sie aus Kundensicht meist auf eine sog. „Story Card“ aufgeschrieben. Sie werden digital oder physisch als DIN A 5 oder DIN A 6 verwendet (vgl. Jeffries/Anderson/Hendrickson 2001b, S. 42). </a:t>
+            </a:r>
+          </a:p>
+          <a:p>
+            <a:pPr marL="271463" lvl="0" indent="-271463" algn="just"/>
             <a:r>
               <a:rPr lang="de-DE" dirty="0">
                 <a:solidFill>
@@ -1808,7 +1813,7 @@
             </a:r>
           </a:p>
           <a:p>
-            <a:pPr marL="271463" lvl="0" indent="-271463"/>
+            <a:pPr marL="271463" lvl="0" indent="-271463" algn="just"/>
             <a:r>
               <a:rPr lang="de-DE" dirty="0">
                 <a:solidFill>
@@ -1821,7 +1826,7 @@
             </a:r>
           </a:p>
           <a:p>
-            <a:pPr marL="271463" lvl="0" indent="-271463"/>
+            <a:pPr marL="271463" lvl="0" indent="-271463" algn="just"/>
             <a:r>
               <a:rPr lang="de-DE" dirty="0">
                 <a:solidFill>
@@ -1830,18 +1835,90 @@
                 <a:latin typeface="Avenir Book"/>
                 <a:cs typeface="Avenir Book"/>
               </a:rPr>
-              <a:t>Im Musikstück ist eine User Story vergleichbar mit </a:t>
-            </a:r>
-            <a:r>
-              <a:rPr lang="de-DE">
-                <a:solidFill>
-                  <a:srgbClr val="747982"/>
-                </a:solidFill>
-                <a:latin typeface="Avenir Book"/>
-                <a:cs typeface="Avenir Book"/>
-              </a:rPr>
-              <a:t>einer Phrase.</a:t>
-            </a:r>
+              <a:t>Im Musikstück ist eine User Story vergleichbar mit einer Phrase.</a:t>
+            </a:r>
+          </a:p>
+          <a:p>
+            <a:pPr marL="271463" lvl="0" indent="-271463" algn="just"/>
+            <a:r>
+              <a:rPr lang="de-DE" dirty="0">
+                <a:solidFill>
+                  <a:srgbClr val="747982"/>
+                </a:solidFill>
+                <a:latin typeface="Avenir Book"/>
+                <a:cs typeface="Avenir Book"/>
+              </a:rPr>
+              <a:t>Phrasen unterteilen ein Stück in Bausteine, deren Komplexität überschaubar ist. Sie sind ungefähr 1 - 8 Takte lang und haben ein klaren Start- und </a:t>
+            </a:r>
+            <a:r>
+              <a:rPr lang="de-DE" dirty="0" err="1">
+                <a:solidFill>
+                  <a:srgbClr val="747982"/>
+                </a:solidFill>
+                <a:latin typeface="Avenir Book"/>
+                <a:cs typeface="Avenir Book"/>
+              </a:rPr>
+              <a:t>Endton</a:t>
+            </a:r>
+            <a:r>
+              <a:rPr lang="de-DE" dirty="0">
+                <a:solidFill>
+                  <a:srgbClr val="747982"/>
+                </a:solidFill>
+                <a:latin typeface="Avenir Book"/>
+                <a:cs typeface="Avenir Book"/>
+              </a:rPr>
+              <a:t>.</a:t>
+            </a:r>
+          </a:p>
+          <a:p>
+            <a:pPr marL="271463" lvl="0" indent="-271463" algn="just"/>
+            <a:r>
+              <a:rPr lang="de-DE" dirty="0">
+                <a:solidFill>
+                  <a:srgbClr val="747982"/>
+                </a:solidFill>
+                <a:latin typeface="Avenir Book"/>
+                <a:cs typeface="Avenir Book"/>
+              </a:rPr>
+              <a:t>Mit einer formalen </a:t>
+            </a:r>
+            <a:r>
+              <a:rPr lang="de-DE" dirty="0" err="1">
+                <a:solidFill>
+                  <a:srgbClr val="747982"/>
+                </a:solidFill>
+                <a:latin typeface="Avenir Book"/>
+                <a:cs typeface="Avenir Book"/>
+              </a:rPr>
+              <a:t>Phrasenanalayse</a:t>
+            </a:r>
+            <a:r>
+              <a:rPr lang="de-DE" dirty="0">
+                <a:solidFill>
+                  <a:srgbClr val="747982"/>
+                </a:solidFill>
+                <a:latin typeface="Avenir Book"/>
+                <a:cs typeface="Avenir Book"/>
+              </a:rPr>
+              <a:t> ist es Dir möglich Deine Tomaten taktgenau zu benennen, sodass Deine Zielformulierungen an Präzision gewinnen. Genau wie die Überprüfung Deiner Ziele.</a:t>
+            </a:r>
+          </a:p>
+          <a:p>
+            <a:pPr marL="271463" lvl="0" indent="-271463" algn="just"/>
+            <a:r>
+              <a:rPr lang="de-DE" dirty="0">
+                <a:solidFill>
+                  <a:srgbClr val="747982"/>
+                </a:solidFill>
+                <a:latin typeface="Avenir Book"/>
+                <a:cs typeface="Avenir Book"/>
+              </a:rPr>
+              <a:t>Mit dem „Phrasendiagramm“ kannst Du diese Analyse auf eine Übersicht geben. Du erkennst durch die formale Analyse wie viele Phrasen das Stück hat und welche Phrasen sich in dem Stück wiederholen und an anderer Stelle nochmals auftauchen.</a:t>
+            </a:r>
+          </a:p>
+          <a:p>
+            <a:pPr marL="271463" lvl="0" indent="-271463" algn="just"/>
             <a:endParaRPr lang="de-DE" dirty="0">
               <a:solidFill>
                 <a:srgbClr val="747982"/>
@@ -1851,82 +1928,143 @@
             </a:endParaRPr>
           </a:p>
           <a:p>
-            <a:pPr marL="271463" lvl="0" indent="-271463"/>
-            <a:r>
-              <a:rPr lang="de-DE" dirty="0">
-                <a:solidFill>
-                  <a:srgbClr val="747982"/>
-                </a:solidFill>
-                <a:latin typeface="Avenir Book"/>
-                <a:cs typeface="Avenir Book"/>
-              </a:rPr>
-              <a:t>Phrasen unterteilen ein Stück in Bausteine, deren Komplexität überschaubar ist. Sie sind ungefähr 1 - 8 Takte lang und haben ein klaren Start- und </a:t>
-            </a:r>
-            <a:r>
-              <a:rPr lang="de-DE" dirty="0" err="1">
-                <a:solidFill>
-                  <a:srgbClr val="747982"/>
-                </a:solidFill>
-                <a:latin typeface="Avenir Book"/>
-                <a:cs typeface="Avenir Book"/>
-              </a:rPr>
-              <a:t>Endton</a:t>
-            </a:r>
-            <a:r>
-              <a:rPr lang="de-DE" dirty="0">
-                <a:solidFill>
-                  <a:srgbClr val="747982"/>
-                </a:solidFill>
-                <a:latin typeface="Avenir Book"/>
-                <a:cs typeface="Avenir Book"/>
-              </a:rPr>
-              <a:t>.</a:t>
-            </a:r>
-          </a:p>
-          <a:p>
-            <a:pPr marL="271463" lvl="0" indent="-271463"/>
-            <a:r>
-              <a:rPr lang="de-DE" dirty="0">
-                <a:solidFill>
-                  <a:srgbClr val="747982"/>
-                </a:solidFill>
-                <a:latin typeface="Avenir Book"/>
-                <a:cs typeface="Avenir Book"/>
-              </a:rPr>
-              <a:t>Mit einer formalen </a:t>
-            </a:r>
-            <a:r>
-              <a:rPr lang="de-DE" dirty="0" err="1">
-                <a:solidFill>
-                  <a:srgbClr val="747982"/>
-                </a:solidFill>
-                <a:latin typeface="Avenir Book"/>
-                <a:cs typeface="Avenir Book"/>
-              </a:rPr>
-              <a:t>Phrasenanalayse</a:t>
-            </a:r>
-            <a:r>
-              <a:rPr lang="de-DE" dirty="0">
-                <a:solidFill>
-                  <a:srgbClr val="747982"/>
-                </a:solidFill>
-                <a:latin typeface="Avenir Book"/>
-                <a:cs typeface="Avenir Book"/>
-              </a:rPr>
-              <a:t> ist es Dir möglich Deine Tomaten taktgenau zu benennen, sodass Deine Zielformulierungen an Präzision gewinnen. Genau wie die Überprüfung Deiner Ziele.</a:t>
-            </a:r>
-          </a:p>
-          <a:p>
-            <a:pPr marL="271463" lvl="0" indent="-271463"/>
-            <a:r>
-              <a:rPr lang="de-DE" dirty="0">
-                <a:solidFill>
-                  <a:srgbClr val="747982"/>
-                </a:solidFill>
-                <a:latin typeface="Avenir Book"/>
-                <a:cs typeface="Avenir Book"/>
-              </a:rPr>
-              <a:t>Mit dem „Phrasendiagramm“ kannst Du diese Analyse auf eine Übersicht geben. Du erkennst durch die formale Analyse wie viele Phrasen das Stück hat und welche Phrasen sich in dem Stück wiederholen und an anderer Stelle nochmals auftauchen.</a:t>
+            <a:pPr marL="0" lvl="0" indent="0" algn="just">
+              <a:buNone/>
+            </a:pPr>
+            <a:r>
+              <a:rPr lang="de-DE" sz="800" b="1" dirty="0">
+                <a:solidFill>
+                  <a:srgbClr val="747982"/>
+                </a:solidFill>
+                <a:latin typeface="Avenir Book"/>
+                <a:cs typeface="Avenir Book"/>
+              </a:rPr>
+              <a:t>Quellen:</a:t>
+            </a:r>
+            <a:r>
+              <a:rPr lang="de-DE" sz="800" dirty="0">
+                <a:solidFill>
+                  <a:srgbClr val="747982"/>
+                </a:solidFill>
+                <a:latin typeface="Avenir Book"/>
+                <a:cs typeface="Avenir Book"/>
+              </a:rPr>
+              <a:t> </a:t>
+            </a:r>
+            <a:r>
+              <a:rPr lang="de-DE" sz="800" b="1" dirty="0">
+                <a:solidFill>
+                  <a:srgbClr val="747982"/>
+                </a:solidFill>
+                <a:latin typeface="Avenir Book"/>
+                <a:cs typeface="Avenir Book"/>
+              </a:rPr>
+              <a:t>Cohn</a:t>
+            </a:r>
+            <a:r>
+              <a:rPr lang="de-DE" sz="800" dirty="0">
+                <a:solidFill>
+                  <a:srgbClr val="747982"/>
+                </a:solidFill>
+                <a:latin typeface="Avenir Book"/>
+                <a:cs typeface="Avenir Book"/>
+              </a:rPr>
+              <a:t>, Mike (2004): User Stories Applied: </a:t>
+            </a:r>
+            <a:r>
+              <a:rPr lang="de-DE" sz="800" dirty="0" err="1">
+                <a:solidFill>
+                  <a:srgbClr val="747982"/>
+                </a:solidFill>
+                <a:latin typeface="Avenir Book"/>
+                <a:cs typeface="Avenir Book"/>
+              </a:rPr>
+              <a:t>For</a:t>
+            </a:r>
+            <a:r>
+              <a:rPr lang="de-DE" sz="800" dirty="0">
+                <a:solidFill>
+                  <a:srgbClr val="747982"/>
+                </a:solidFill>
+                <a:latin typeface="Avenir Book"/>
+                <a:cs typeface="Avenir Book"/>
+              </a:rPr>
+              <a:t> Agile Software Development. Boston: Addison-Wesley Professional</a:t>
+            </a:r>
+          </a:p>
+          <a:p>
+            <a:pPr marL="0" lvl="0" indent="0" algn="just">
+              <a:buNone/>
+            </a:pPr>
+            <a:r>
+              <a:rPr lang="de-DE" sz="800">
+                <a:solidFill>
+                  <a:srgbClr val="747982"/>
+                </a:solidFill>
+                <a:latin typeface="Avenir Book"/>
+                <a:cs typeface="Avenir Book"/>
+              </a:rPr>
+              <a:t>	 </a:t>
+            </a:r>
+            <a:r>
+              <a:rPr lang="de-DE" sz="800" b="1">
+                <a:solidFill>
+                  <a:srgbClr val="747982"/>
+                </a:solidFill>
+                <a:latin typeface="Avenir Book"/>
+                <a:cs typeface="Avenir Book"/>
+              </a:rPr>
+              <a:t>Jeffries</a:t>
+            </a:r>
+            <a:r>
+              <a:rPr lang="de-DE" sz="800" dirty="0">
+                <a:solidFill>
+                  <a:srgbClr val="747982"/>
+                </a:solidFill>
+                <a:latin typeface="Avenir Book"/>
+                <a:cs typeface="Avenir Book"/>
+              </a:rPr>
+              <a:t>, Ron/Anderson, Ann/Hendrickson, Chet (2001): Extreme </a:t>
+            </a:r>
+            <a:r>
+              <a:rPr lang="de-DE" sz="800" dirty="0" err="1">
+                <a:solidFill>
+                  <a:srgbClr val="747982"/>
+                </a:solidFill>
+                <a:latin typeface="Avenir Book"/>
+                <a:cs typeface="Avenir Book"/>
+              </a:rPr>
+              <a:t>Programming</a:t>
+            </a:r>
+            <a:r>
+              <a:rPr lang="de-DE" sz="800" dirty="0">
+                <a:solidFill>
+                  <a:srgbClr val="747982"/>
+                </a:solidFill>
+                <a:latin typeface="Avenir Book"/>
+                <a:cs typeface="Avenir Book"/>
+              </a:rPr>
+              <a:t> </a:t>
+            </a:r>
+            <a:r>
+              <a:rPr lang="de-DE" sz="800" dirty="0" err="1">
+                <a:solidFill>
+                  <a:srgbClr val="747982"/>
+                </a:solidFill>
+                <a:latin typeface="Avenir Book"/>
+                <a:cs typeface="Avenir Book"/>
+              </a:rPr>
+              <a:t>Installed</a:t>
+            </a:r>
+            <a:r>
+              <a:rPr lang="de-DE" sz="800" dirty="0">
+                <a:solidFill>
+                  <a:srgbClr val="747982"/>
+                </a:solidFill>
+                <a:latin typeface="Avenir Book"/>
+                <a:cs typeface="Avenir Book"/>
+              </a:rPr>
+              <a:t>. München: Addison Wesley</a:t>
             </a:r>
           </a:p>
         </p:txBody>
@@ -2030,12 +2168,14 @@
         </p:nvSpPr>
         <p:spPr/>
         <p:txBody>
-          <a:bodyPr/>
+          <a:bodyPr>
+            <a:normAutofit/>
+          </a:bodyPr>
           <a:lstStyle/>
           <a:p>
-            <a:pPr marL="271463" indent="-271463"/>
-            <a:r>
-              <a:rPr lang="de-DE" dirty="0">
+            <a:pPr marL="271463" indent="-271463" algn="just"/>
+            <a:r>
+              <a:rPr lang="de-DE" sz="1200" dirty="0">
                 <a:solidFill>
                   <a:srgbClr val="747982"/>
                 </a:solidFill>
@@ -2046,9 +2186,9 @@
             </a:r>
           </a:p>
           <a:p>
-            <a:pPr marL="271463" indent="-271463"/>
-            <a:r>
-              <a:rPr lang="de-DE" dirty="0">
+            <a:pPr marL="271463" indent="-271463" algn="just"/>
+            <a:r>
+              <a:rPr lang="de-DE" sz="1200" dirty="0">
                 <a:solidFill>
                   <a:srgbClr val="747982"/>
                 </a:solidFill>
@@ -2059,9 +2199,9 @@
             </a:r>
           </a:p>
           <a:p>
-            <a:pPr marL="271463" indent="-271463"/>
-            <a:r>
-              <a:rPr lang="de-DE" dirty="0">
+            <a:pPr marL="271463" indent="-271463" algn="just"/>
+            <a:r>
+              <a:rPr lang="de-DE" sz="1200" dirty="0">
                 <a:solidFill>
                   <a:srgbClr val="747982"/>
                 </a:solidFill>

</xml_diff>